<commit_message>
update text size on plots and square brackets in table 1
</commit_message>
<xml_diff>
--- a/plots/map.together.pptx
+++ b/plots/map.together.pptx
@@ -104,6 +104,11 @@
       </a:defRPr>
     </a:lvl9pPr>
   </p:defaultTextStyle>
+  <p:extLst>
+    <p:ext uri="{EFAFB233-063F-42B5-8137-9DF3F51BA10A}">
+      <p15:sldGuideLst xmlns:p15="http://schemas.microsoft.com/office/powerpoint/2012/main"/>
+    </p:ext>
+  </p:extLst>
 </p:presentation>
 </file>
 
@@ -238,7 +243,7 @@
           <a:p>
             <a:fld id="{FB94F06E-BA44-D04B-BC1C-E5EF1623CFF5}" type="datetimeFigureOut">
               <a:rPr lang="en-US" smtClean="0"/>
-              <a:t>10/5/23</a:t>
+              <a:t>10/6/23</a:t>
             </a:fld>
             <a:endParaRPr lang="en-US"/>
           </a:p>
@@ -408,7 +413,7 @@
           <a:p>
             <a:fld id="{FB94F06E-BA44-D04B-BC1C-E5EF1623CFF5}" type="datetimeFigureOut">
               <a:rPr lang="en-US" smtClean="0"/>
-              <a:t>10/5/23</a:t>
+              <a:t>10/6/23</a:t>
             </a:fld>
             <a:endParaRPr lang="en-US"/>
           </a:p>
@@ -588,7 +593,7 @@
           <a:p>
             <a:fld id="{FB94F06E-BA44-D04B-BC1C-E5EF1623CFF5}" type="datetimeFigureOut">
               <a:rPr lang="en-US" smtClean="0"/>
-              <a:t>10/5/23</a:t>
+              <a:t>10/6/23</a:t>
             </a:fld>
             <a:endParaRPr lang="en-US"/>
           </a:p>
@@ -758,7 +763,7 @@
           <a:p>
             <a:fld id="{FB94F06E-BA44-D04B-BC1C-E5EF1623CFF5}" type="datetimeFigureOut">
               <a:rPr lang="en-US" smtClean="0"/>
-              <a:t>10/5/23</a:t>
+              <a:t>10/6/23</a:t>
             </a:fld>
             <a:endParaRPr lang="en-US"/>
           </a:p>
@@ -1002,7 +1007,7 @@
           <a:p>
             <a:fld id="{FB94F06E-BA44-D04B-BC1C-E5EF1623CFF5}" type="datetimeFigureOut">
               <a:rPr lang="en-US" smtClean="0"/>
-              <a:t>10/5/23</a:t>
+              <a:t>10/6/23</a:t>
             </a:fld>
             <a:endParaRPr lang="en-US"/>
           </a:p>
@@ -1234,7 +1239,7 @@
           <a:p>
             <a:fld id="{FB94F06E-BA44-D04B-BC1C-E5EF1623CFF5}" type="datetimeFigureOut">
               <a:rPr lang="en-US" smtClean="0"/>
-              <a:t>10/5/23</a:t>
+              <a:t>10/6/23</a:t>
             </a:fld>
             <a:endParaRPr lang="en-US"/>
           </a:p>
@@ -1601,7 +1606,7 @@
           <a:p>
             <a:fld id="{FB94F06E-BA44-D04B-BC1C-E5EF1623CFF5}" type="datetimeFigureOut">
               <a:rPr lang="en-US" smtClean="0"/>
-              <a:t>10/5/23</a:t>
+              <a:t>10/6/23</a:t>
             </a:fld>
             <a:endParaRPr lang="en-US"/>
           </a:p>
@@ -1719,7 +1724,7 @@
           <a:p>
             <a:fld id="{FB94F06E-BA44-D04B-BC1C-E5EF1623CFF5}" type="datetimeFigureOut">
               <a:rPr lang="en-US" smtClean="0"/>
-              <a:t>10/5/23</a:t>
+              <a:t>10/6/23</a:t>
             </a:fld>
             <a:endParaRPr lang="en-US"/>
           </a:p>
@@ -1814,7 +1819,7 @@
           <a:p>
             <a:fld id="{FB94F06E-BA44-D04B-BC1C-E5EF1623CFF5}" type="datetimeFigureOut">
               <a:rPr lang="en-US" smtClean="0"/>
-              <a:t>10/5/23</a:t>
+              <a:t>10/6/23</a:t>
             </a:fld>
             <a:endParaRPr lang="en-US"/>
           </a:p>
@@ -2091,7 +2096,7 @@
           <a:p>
             <a:fld id="{FB94F06E-BA44-D04B-BC1C-E5EF1623CFF5}" type="datetimeFigureOut">
               <a:rPr lang="en-US" smtClean="0"/>
-              <a:t>10/5/23</a:t>
+              <a:t>10/6/23</a:t>
             </a:fld>
             <a:endParaRPr lang="en-US"/>
           </a:p>
@@ -2348,7 +2353,7 @@
           <a:p>
             <a:fld id="{FB94F06E-BA44-D04B-BC1C-E5EF1623CFF5}" type="datetimeFigureOut">
               <a:rPr lang="en-US" smtClean="0"/>
-              <a:t>10/5/23</a:t>
+              <a:t>10/6/23</a:t>
             </a:fld>
             <a:endParaRPr lang="en-US"/>
           </a:p>
@@ -2561,7 +2566,7 @@
           <a:p>
             <a:fld id="{FB94F06E-BA44-D04B-BC1C-E5EF1623CFF5}" type="datetimeFigureOut">
               <a:rPr lang="en-US" smtClean="0"/>
-              <a:t>10/5/23</a:t>
+              <a:t>10/6/23</a:t>
             </a:fld>
             <a:endParaRPr lang="en-US"/>
           </a:p>
@@ -2968,7 +2973,36 @@
       </p:grpSpPr>
       <p:pic>
         <p:nvPicPr>
-          <p:cNvPr id="5" name="Picture 4" descr="A map of the mountain caribou&#10;&#10;Description automatically generated">
+          <p:cNvPr id="6" name="Picture 5">
+            <a:extLst>
+              <a:ext uri="{FF2B5EF4-FFF2-40B4-BE49-F238E27FC236}">
+                <a16:creationId xmlns:a16="http://schemas.microsoft.com/office/drawing/2014/main" id="{F51ADBDF-D1C3-7ECE-B763-97C8E0FC7AAA}"/>
+              </a:ext>
+            </a:extLst>
+          </p:cNvPr>
+          <p:cNvPicPr>
+            <a:picLocks noChangeAspect="1"/>
+          </p:cNvPicPr>
+          <p:nvPr/>
+        </p:nvPicPr>
+        <p:blipFill rotWithShape="1">
+          <a:blip r:embed="rId2"/>
+          <a:srcRect t="-156" b="86592"/>
+          <a:stretch/>
+        </p:blipFill>
+        <p:spPr>
+          <a:xfrm>
+            <a:off x="0" y="271515"/>
+            <a:ext cx="10287002" cy="930167"/>
+          </a:xfrm>
+          <a:prstGeom prst="rect">
+            <a:avLst/>
+          </a:prstGeom>
+        </p:spPr>
+      </p:pic>
+      <p:pic>
+        <p:nvPicPr>
+          <p:cNvPr id="5" name="Picture 4">
             <a:extLst>
               <a:ext uri="{FF2B5EF4-FFF2-40B4-BE49-F238E27FC236}">
                 <a16:creationId xmlns:a16="http://schemas.microsoft.com/office/drawing/2014/main" id="{12D71E1E-5373-1B74-DBDC-27332A07D43E}"/>
@@ -2997,35 +3031,6 @@
       </p:pic>
       <p:pic>
         <p:nvPicPr>
-          <p:cNvPr id="6" name="Picture 5" descr="A map of the mountain caribou&#10;&#10;Description automatically generated">
-            <a:extLst>
-              <a:ext uri="{FF2B5EF4-FFF2-40B4-BE49-F238E27FC236}">
-                <a16:creationId xmlns:a16="http://schemas.microsoft.com/office/drawing/2014/main" id="{F51ADBDF-D1C3-7ECE-B763-97C8E0FC7AAA}"/>
-              </a:ext>
-            </a:extLst>
-          </p:cNvPr>
-          <p:cNvPicPr>
-            <a:picLocks noChangeAspect="1"/>
-          </p:cNvPicPr>
-          <p:nvPr/>
-        </p:nvPicPr>
-        <p:blipFill rotWithShape="1">
-          <a:blip r:embed="rId2"/>
-          <a:srcRect b="86437"/>
-          <a:stretch/>
-        </p:blipFill>
-        <p:spPr>
-          <a:xfrm>
-            <a:off x="0" y="271515"/>
-            <a:ext cx="10287002" cy="930167"/>
-          </a:xfrm>
-          <a:prstGeom prst="rect">
-            <a:avLst/>
-          </a:prstGeom>
-        </p:spPr>
-      </p:pic>
-      <p:pic>
-        <p:nvPicPr>
           <p:cNvPr id="7" name="Picture 6" descr="A map of the mountain caribou&#10;&#10;Description automatically generated">
             <a:extLst>
               <a:ext uri="{FF2B5EF4-FFF2-40B4-BE49-F238E27FC236}">
@@ -3039,7 +3044,7 @@
           <p:nvPr/>
         </p:nvPicPr>
         <p:blipFill rotWithShape="1">
-          <a:blip r:embed="rId2"/>
+          <a:blip r:embed="rId3"/>
           <a:srcRect l="16180" t="13086" r="70356" b="76791"/>
           <a:stretch/>
         </p:blipFill>
@@ -3068,13 +3073,13 @@
           <p:nvPr/>
         </p:nvPicPr>
         <p:blipFill rotWithShape="1">
-          <a:blip r:embed="rId2"/>
+          <a:blip r:embed="rId3"/>
           <a:srcRect l="38614" t="14091" r="50473" b="80101"/>
           <a:stretch/>
         </p:blipFill>
         <p:spPr>
           <a:xfrm>
-            <a:off x="2169385" y="955813"/>
+            <a:off x="2174003" y="960481"/>
             <a:ext cx="1122630" cy="398352"/>
           </a:xfrm>
           <a:prstGeom prst="rect">
@@ -3097,7 +3102,7 @@
           <p:nvPr/>
         </p:nvPicPr>
         <p:blipFill rotWithShape="1">
-          <a:blip r:embed="rId2"/>
+          <a:blip r:embed="rId3"/>
           <a:srcRect l="29753" t="18538" r="62236" b="77787"/>
           <a:stretch/>
         </p:blipFill>
@@ -3126,7 +3131,7 @@
           <p:nvPr/>
         </p:nvPicPr>
         <p:blipFill rotWithShape="1">
-          <a:blip r:embed="rId2"/>
+          <a:blip r:embed="rId3"/>
           <a:srcRect l="3955" t="14583" r="84101" b="81250"/>
           <a:stretch/>
         </p:blipFill>
@@ -3155,7 +3160,7 @@
           <p:nvPr/>
         </p:nvPicPr>
         <p:blipFill rotWithShape="1">
-          <a:blip r:embed="rId2"/>
+          <a:blip r:embed="rId3"/>
           <a:srcRect l="29672" t="14942" r="60953" b="81463"/>
           <a:stretch/>
         </p:blipFill>

</xml_diff>